<commit_message>
update to paper slides
</commit_message>
<xml_diff>
--- a/Slides/On-Campus/03_Paper_Review.pptx
+++ b/Slides/On-Campus/03_Paper_Review.pptx
@@ -5,23 +5,24 @@
     <p:sldMasterId id="2147483648" r:id="rId1"/>
   </p:sldMasterIdLst>
   <p:notesMasterIdLst>
-    <p:notesMasterId r:id="rId13"/>
+    <p:notesMasterId r:id="rId14"/>
   </p:notesMasterIdLst>
   <p:handoutMasterIdLst>
-    <p:handoutMasterId r:id="rId14"/>
+    <p:handoutMasterId r:id="rId15"/>
   </p:handoutMasterIdLst>
   <p:sldIdLst>
     <p:sldId id="256" r:id="rId2"/>
     <p:sldId id="266" r:id="rId3"/>
     <p:sldId id="270" r:id="rId4"/>
-    <p:sldId id="267" r:id="rId5"/>
-    <p:sldId id="268" r:id="rId6"/>
-    <p:sldId id="259" r:id="rId7"/>
-    <p:sldId id="269" r:id="rId8"/>
-    <p:sldId id="271" r:id="rId9"/>
-    <p:sldId id="272" r:id="rId10"/>
-    <p:sldId id="273" r:id="rId11"/>
-    <p:sldId id="274" r:id="rId12"/>
+    <p:sldId id="275" r:id="rId5"/>
+    <p:sldId id="267" r:id="rId6"/>
+    <p:sldId id="268" r:id="rId7"/>
+    <p:sldId id="259" r:id="rId8"/>
+    <p:sldId id="269" r:id="rId9"/>
+    <p:sldId id="271" r:id="rId10"/>
+    <p:sldId id="272" r:id="rId11"/>
+    <p:sldId id="273" r:id="rId12"/>
+    <p:sldId id="274" r:id="rId13"/>
   </p:sldIdLst>
   <p:sldSz cx="13817600" cy="7772400"/>
   <p:notesSz cx="6858000" cy="9144000"/>
@@ -224,7 +225,7 @@
           <a:p>
             <a:fld id="{4D7E51A5-B478-1E40-8CBB-0DAA8831E99D}" type="datetimeFigureOut">
               <a:rPr lang="en-US" smtClean="0"/>
-              <a:t>9/6/21</a:t>
+              <a:t>1/30/2022</a:t>
             </a:fld>
             <a:endParaRPr lang="en-US"/>
           </a:p>
@@ -389,7 +390,7 @@
           <a:p>
             <a:fld id="{D0ED587F-861E-6740-9643-E3DDAE89B8D6}" type="datetimeFigureOut">
               <a:rPr lang="en-US" smtClean="0"/>
-              <a:t>9/6/21</a:t>
+              <a:t>1/30/2022</a:t>
             </a:fld>
             <a:endParaRPr lang="en-US"/>
           </a:p>
@@ -6712,7 +6713,166 @@
 </file>
 
 <file path=ppt/slides/slide10.xml><?xml version="1.0" encoding="utf-8"?>
-<p:sld xmlns:a="http://schemas.openxmlformats.org/drawingml/2006/main" xmlns:r="http://schemas.openxmlformats.org/officeDocument/2006/relationships" xmlns:p="http://schemas.openxmlformats.org/presentationml/2006/main">
+<p:sld xmlns:a="http://schemas.openxmlformats.org/drawingml/2006/main" xmlns:r="http://schemas.openxmlformats.org/officeDocument/2006/relationships" xmlns:p="http://schemas.openxmlformats.org/presentationml/2006/main" show="0">
+  <p:cSld>
+    <p:spTree>
+      <p:nvGrpSpPr>
+        <p:cNvPr id="1" name=""/>
+        <p:cNvGrpSpPr/>
+        <p:nvPr/>
+      </p:nvGrpSpPr>
+      <p:grpSpPr>
+        <a:xfrm>
+          <a:off x="0" y="0"/>
+          <a:ext cx="0" cy="0"/>
+          <a:chOff x="0" y="0"/>
+          <a:chExt cx="0" cy="0"/>
+        </a:xfrm>
+      </p:grpSpPr>
+      <p:sp>
+        <p:nvSpPr>
+          <p:cNvPr id="4" name="Title 3">
+            <a:extLst>
+              <a:ext uri="{FF2B5EF4-FFF2-40B4-BE49-F238E27FC236}">
+                <a16:creationId xmlns:a16="http://schemas.microsoft.com/office/drawing/2014/main" id="{5AB0F837-3458-D44B-A907-7FE8B69C1A41}"/>
+              </a:ext>
+            </a:extLst>
+          </p:cNvPr>
+          <p:cNvSpPr>
+            <a:spLocks noGrp="1"/>
+          </p:cNvSpPr>
+          <p:nvPr>
+            <p:ph type="title"/>
+          </p:nvPr>
+        </p:nvSpPr>
+        <p:spPr/>
+        <p:txBody>
+          <a:bodyPr/>
+          <a:lstStyle/>
+          <a:p>
+            <a:r>
+              <a:rPr lang="en-US" dirty="0"/>
+              <a:t>Coding Practice / Follow Along</a:t>
+            </a:r>
+          </a:p>
+        </p:txBody>
+      </p:sp>
+      <p:sp>
+        <p:nvSpPr>
+          <p:cNvPr id="5" name="Text Placeholder 4">
+            <a:extLst>
+              <a:ext uri="{FF2B5EF4-FFF2-40B4-BE49-F238E27FC236}">
+                <a16:creationId xmlns:a16="http://schemas.microsoft.com/office/drawing/2014/main" id="{DE647D6A-00E7-624E-B4D8-81F5C67D0ABB}"/>
+              </a:ext>
+            </a:extLst>
+          </p:cNvPr>
+          <p:cNvSpPr>
+            <a:spLocks noGrp="1"/>
+          </p:cNvSpPr>
+          <p:nvPr>
+            <p:ph type="body" sz="quarter" idx="10"/>
+          </p:nvPr>
+        </p:nvSpPr>
+        <p:spPr>
+          <a:xfrm>
+            <a:off x="628075" y="1776683"/>
+            <a:ext cx="12561453" cy="3464538"/>
+          </a:xfrm>
+        </p:spPr>
+        <p:txBody>
+          <a:bodyPr/>
+          <a:lstStyle/>
+          <a:p>
+            <a:r>
+              <a:rPr lang="en-US" dirty="0"/>
+              <a:t>Write a code that</a:t>
+            </a:r>
+          </a:p>
+          <a:p>
+            <a:pPr lvl="1"/>
+            <a:r>
+              <a:rPr lang="en-US" dirty="0"/>
+              <a:t>takes two parameters from the client</a:t>
+            </a:r>
+          </a:p>
+          <a:p>
+            <a:pPr lvl="2"/>
+            <a:r>
+              <a:rPr lang="en-US" dirty="0"/>
+              <a:t>a name, and then number</a:t>
+            </a:r>
+          </a:p>
+          <a:p>
+            <a:pPr lvl="1"/>
+            <a:r>
+              <a:rPr lang="en-US" dirty="0"/>
+              <a:t>It then prints out the name and number separated by a comma</a:t>
+            </a:r>
+          </a:p>
+          <a:p>
+            <a:pPr lvl="1"/>
+            <a:r>
+              <a:rPr lang="en-US" dirty="0"/>
+              <a:t>The number should only have at most two decimal places. </a:t>
+            </a:r>
+          </a:p>
+          <a:p>
+            <a:pPr lvl="2"/>
+            <a:r>
+              <a:rPr lang="en-US" dirty="0"/>
+              <a:t>Example Output</a:t>
+            </a:r>
+          </a:p>
+          <a:p>
+            <a:pPr lvl="3"/>
+            <a:r>
+              <a:rPr lang="en-US" dirty="0"/>
+              <a:t>Amy Pond,12.2</a:t>
+            </a:r>
+          </a:p>
+          <a:p>
+            <a:pPr lvl="3"/>
+            <a:r>
+              <a:rPr lang="en-US" dirty="0"/>
+              <a:t>Rory Williams,14.22</a:t>
+            </a:r>
+          </a:p>
+          <a:p>
+            <a:pPr lvl="3"/>
+            <a:r>
+              <a:rPr lang="en-US" dirty="0"/>
+              <a:t>Clara Osborn,100.12</a:t>
+            </a:r>
+          </a:p>
+        </p:txBody>
+      </p:sp>
+    </p:spTree>
+    <p:extLst>
+      <p:ext uri="{BB962C8B-B14F-4D97-AF65-F5344CB8AC3E}">
+        <p14:creationId xmlns:p14="http://schemas.microsoft.com/office/powerpoint/2010/main" val="3369171097"/>
+      </p:ext>
+    </p:extLst>
+  </p:cSld>
+  <p:clrMapOvr>
+    <a:masterClrMapping/>
+  </p:clrMapOvr>
+  <mc:AlternateContent xmlns:mc="http://schemas.openxmlformats.org/markup-compatibility/2006">
+    <mc:Choice xmlns:p14="http://schemas.microsoft.com/office/powerpoint/2010/main" Requires="p14">
+      <p:transition p14:dur="300">
+        <p:fade/>
+      </p:transition>
+    </mc:Choice>
+    <mc:Fallback>
+      <p:transition>
+        <p:fade/>
+      </p:transition>
+    </mc:Fallback>
+  </mc:AlternateContent>
+</p:sld>
+</file>
+
+<file path=ppt/slides/slide11.xml><?xml version="1.0" encoding="utf-8"?>
+<p:sld xmlns:a="http://schemas.openxmlformats.org/drawingml/2006/main" xmlns:r="http://schemas.openxmlformats.org/officeDocument/2006/relationships" xmlns:p="http://schemas.openxmlformats.org/presentationml/2006/main" show="0">
   <p:cSld>
     <p:spTree>
       <p:nvGrpSpPr>
@@ -6825,13 +6985,13 @@
   <p:clrMapOvr>
     <a:masterClrMapping/>
   </p:clrMapOvr>
-  <mc:AlternateContent xmlns:mc="http://schemas.openxmlformats.org/markup-compatibility/2006" xmlns:p14="http://schemas.microsoft.com/office/powerpoint/2010/main">
-    <mc:Choice Requires="p14">
+  <mc:AlternateContent xmlns:mc="http://schemas.openxmlformats.org/markup-compatibility/2006">
+    <mc:Choice xmlns:p14="http://schemas.microsoft.com/office/powerpoint/2010/main" Requires="p14">
       <p:transition p14:dur="300">
         <p:fade/>
       </p:transition>
     </mc:Choice>
-    <mc:Fallback xmlns="">
+    <mc:Fallback>
       <p:transition>
         <p:fade/>
       </p:transition>
@@ -6840,8 +7000,8 @@
 </p:sld>
 </file>
 
-<file path=ppt/slides/slide11.xml><?xml version="1.0" encoding="utf-8"?>
-<p:sld xmlns:a="http://schemas.openxmlformats.org/drawingml/2006/main" xmlns:r="http://schemas.openxmlformats.org/officeDocument/2006/relationships" xmlns:p="http://schemas.openxmlformats.org/presentationml/2006/main">
+<file path=ppt/slides/slide12.xml><?xml version="1.0" encoding="utf-8"?>
+<p:sld xmlns:a="http://schemas.openxmlformats.org/drawingml/2006/main" xmlns:r="http://schemas.openxmlformats.org/officeDocument/2006/relationships" xmlns:p="http://schemas.openxmlformats.org/presentationml/2006/main" show="0">
   <p:cSld>
     <p:spTree>
       <p:nvGrpSpPr>
@@ -6954,13 +7114,13 @@
   <p:clrMapOvr>
     <a:masterClrMapping/>
   </p:clrMapOvr>
-  <mc:AlternateContent xmlns:mc="http://schemas.openxmlformats.org/markup-compatibility/2006" xmlns:p14="http://schemas.microsoft.com/office/powerpoint/2010/main">
-    <mc:Choice Requires="p14">
+  <mc:AlternateContent xmlns:mc="http://schemas.openxmlformats.org/markup-compatibility/2006">
+    <mc:Choice xmlns:p14="http://schemas.microsoft.com/office/powerpoint/2010/main" Requires="p14">
       <p:transition p14:dur="300">
         <p:fade/>
       </p:transition>
     </mc:Choice>
-    <mc:Fallback xmlns="">
+    <mc:Fallback>
       <p:transition>
         <p:fade/>
       </p:transition>
@@ -7033,7 +7193,7 @@
         <p:spPr>
           <a:xfrm>
             <a:off x="628075" y="1776683"/>
-            <a:ext cx="12561453" cy="820738"/>
+            <a:ext cx="7447289" cy="4137799"/>
           </a:xfrm>
         </p:spPr>
         <p:txBody>
@@ -7065,322 +7225,114 @@
               <a:t>Late window until Sunday (hard cutoff)  </a:t>
             </a:r>
           </a:p>
-        </p:txBody>
-      </p:sp>
-      <p:sp>
-        <p:nvSpPr>
-          <p:cNvPr id="6" name="TextBox 5">
-            <a:extLst>
-              <a:ext uri="{FF2B5EF4-FFF2-40B4-BE49-F238E27FC236}">
-                <a16:creationId xmlns:a16="http://schemas.microsoft.com/office/drawing/2014/main" id="{C004D9EF-2FA6-DD44-94EF-6C8F29647067}"/>
-              </a:ext>
-            </a:extLst>
-          </p:cNvPr>
-          <p:cNvSpPr txBox="1"/>
-          <p:nvPr/>
-        </p:nvSpPr>
-        <p:spPr>
-          <a:xfrm>
-            <a:off x="628075" y="3528279"/>
-            <a:ext cx="5394618" cy="1323439"/>
-          </a:xfrm>
-          <a:prstGeom prst="rect">
-            <a:avLst/>
-          </a:prstGeom>
-          <a:noFill/>
-        </p:spPr>
-        <p:txBody>
-          <a:bodyPr wrap="square">
-            <a:spAutoFit/>
-          </a:bodyPr>
-          <a:lstStyle/>
-          <a:p>
-            <a:pPr algn="l"/>
-            <a:r>
-              <a:rPr lang="en-US" sz="2000" b="0" i="0" u="none" strike="noStrike" dirty="0">
-                <a:solidFill>
-                  <a:srgbClr val="000000"/>
-                </a:solidFill>
-                <a:effectLst/>
-                <a:latin typeface="Calibri" panose="020F0502020204030204" pitchFamily="34" charset="0"/>
+          <a:p>
+            <a:r>
+              <a:rPr lang="en-US" dirty="0">
+                <a:solidFill>
+                  <a:srgbClr val="092529"/>
+                </a:solidFill>
               </a:rPr>
-              <a:t>ACM – Caldera Talk </a:t>
-            </a:r>
-          </a:p>
-          <a:p>
-            <a:pPr algn="l"/>
-            <a:r>
-              <a:rPr lang="en-US" sz="2000" b="0" i="0" u="none" strike="noStrike" dirty="0">
-                <a:solidFill>
-                  <a:srgbClr val="000000"/>
-                </a:solidFill>
-                <a:effectLst/>
-                <a:latin typeface="Calibri" panose="020F0502020204030204" pitchFamily="34" charset="0"/>
+              <a:t>Reminder – readings are due </a:t>
+            </a:r>
+            <a:r>
+              <a:rPr lang="en-US" b="1" dirty="0">
+                <a:solidFill>
+                  <a:srgbClr val="092529"/>
+                </a:solidFill>
               </a:rPr>
-              <a:t>When: Wednesday, September 8 at 6:00pm</a:t>
-            </a:r>
-          </a:p>
-          <a:p>
-            <a:pPr algn="l"/>
-            <a:r>
-              <a:rPr lang="en-US" sz="2000" b="0" i="0" u="none" strike="noStrike" dirty="0">
-                <a:solidFill>
-                  <a:srgbClr val="000000"/>
-                </a:solidFill>
-                <a:effectLst/>
-                <a:latin typeface="Calibri" panose="020F0502020204030204" pitchFamily="34" charset="0"/>
+              <a:t>before</a:t>
+            </a:r>
+            <a:r>
+              <a:rPr lang="en-US" dirty="0">
+                <a:solidFill>
+                  <a:srgbClr val="092529"/>
+                </a:solidFill>
               </a:rPr>
-              <a:t>Where: Computer Science Building room 130</a:t>
-            </a:r>
-          </a:p>
-          <a:p>
-            <a:pPr algn="l"/>
-            <a:r>
-              <a:rPr lang="en-US" sz="2000" b="0" i="0" u="none" strike="noStrike" dirty="0">
-                <a:solidFill>
-                  <a:srgbClr val="000000"/>
-                </a:solidFill>
-                <a:effectLst/>
-                <a:latin typeface="Calibri" panose="020F0502020204030204" pitchFamily="34" charset="0"/>
+              <a:t> lecture</a:t>
+            </a:r>
+          </a:p>
+          <a:p>
+            <a:pPr lvl="1"/>
+            <a:r>
+              <a:rPr lang="en-US" dirty="0">
+                <a:solidFill>
+                  <a:srgbClr val="092529"/>
+                </a:solidFill>
               </a:rPr>
-              <a:t>RSVP: </a:t>
-            </a:r>
-            <a:r>
-              <a:rPr lang="en-US" sz="2000" b="0" i="0" u="none" strike="noStrike" dirty="0">
-                <a:solidFill>
-                  <a:srgbClr val="000000"/>
-                </a:solidFill>
-                <a:effectLst/>
-                <a:latin typeface="Calibri" panose="020F0502020204030204" pitchFamily="34" charset="0"/>
-                <a:hlinkClick r:id="rId2" tooltip="Original URL:&#10;https://forms.gle/oV272NkPVFp8eN2P8&#10;&#10;Click to follow link."/>
+              <a:t>You don’t have to do all of it - challenge problems can be challenging…</a:t>
+            </a:r>
+          </a:p>
+          <a:p>
+            <a:pPr lvl="1"/>
+            <a:r>
+              <a:rPr lang="en-US" dirty="0">
+                <a:solidFill>
+                  <a:srgbClr val="092529"/>
+                </a:solidFill>
               </a:rPr>
-              <a:t>https://forms.gle/oV272NkPVFp8eN2P8</a:t>
-            </a:r>
-            <a:endParaRPr lang="en-US" sz="2000" b="0" i="0" u="none" strike="noStrike" dirty="0">
-              <a:solidFill>
-                <a:srgbClr val="000000"/>
-              </a:solidFill>
-              <a:effectLst/>
-              <a:latin typeface="Calibri" panose="020F0502020204030204" pitchFamily="34" charset="0"/>
-            </a:endParaRPr>
-          </a:p>
-        </p:txBody>
-      </p:sp>
-      <p:sp>
-        <p:nvSpPr>
-          <p:cNvPr id="7" name="TextBox 6">
-            <a:extLst>
-              <a:ext uri="{FF2B5EF4-FFF2-40B4-BE49-F238E27FC236}">
-                <a16:creationId xmlns:a16="http://schemas.microsoft.com/office/drawing/2014/main" id="{F488C2B6-F16F-CB4E-85C5-7E44AA51FB00}"/>
-              </a:ext>
-            </a:extLst>
-          </p:cNvPr>
-          <p:cNvSpPr txBox="1"/>
-          <p:nvPr/>
-        </p:nvSpPr>
-        <p:spPr>
-          <a:xfrm>
-            <a:off x="628075" y="5361180"/>
-            <a:ext cx="5394618" cy="1631216"/>
-          </a:xfrm>
-          <a:prstGeom prst="rect">
-            <a:avLst/>
-          </a:prstGeom>
-          <a:noFill/>
-        </p:spPr>
-        <p:txBody>
-          <a:bodyPr wrap="none" rtlCol="0">
-            <a:spAutoFit/>
-          </a:bodyPr>
-          <a:lstStyle/>
-          <a:p>
-            <a:r>
-              <a:rPr lang="en-US" dirty="0"/>
-              <a:t>ACM-W Ice-cream Social</a:t>
-            </a:r>
-          </a:p>
-          <a:p>
-            <a:r>
-              <a:rPr lang="en-US" dirty="0"/>
-              <a:t>When: Thursday September 9</a:t>
-            </a:r>
-            <a:r>
-              <a:rPr lang="en-US" baseline="30000" dirty="0"/>
-              <a:t>th</a:t>
-            </a:r>
-            <a:r>
-              <a:rPr lang="en-US" dirty="0"/>
-              <a:t> at 5:30pm</a:t>
-            </a:r>
-          </a:p>
-          <a:p>
-            <a:r>
-              <a:rPr lang="en-US" dirty="0"/>
-              <a:t>Where: CSB third floor lounge</a:t>
-            </a:r>
-          </a:p>
-          <a:p>
-            <a:r>
-              <a:rPr lang="en-US" dirty="0"/>
-              <a:t>RSVP: </a:t>
-            </a:r>
+              <a:t>You can return to them. </a:t>
+            </a:r>
+          </a:p>
+          <a:p>
             <a:r>
               <a:rPr lang="en-US" dirty="0">
-                <a:hlinkClick r:id="rId3" tooltip="Original URL:&#10;https://forms.gle/diegr3b9MR1VadUX6&#10;&#10;Click to follow link."/>
+                <a:solidFill>
+                  <a:srgbClr val="092529"/>
+                </a:solidFill>
               </a:rPr>
-              <a:t>https://forms.gle/diegr3b9MR1VadUX6</a:t>
-            </a:r>
-            <a:endParaRPr lang="en-US" dirty="0"/>
-          </a:p>
-          <a:p>
-            <a:endParaRPr lang="en-US" dirty="0"/>
-          </a:p>
-        </p:txBody>
-      </p:sp>
-      <p:sp>
-        <p:nvSpPr>
-          <p:cNvPr id="9" name="TextBox 8">
-            <a:extLst>
-              <a:ext uri="{FF2B5EF4-FFF2-40B4-BE49-F238E27FC236}">
-                <a16:creationId xmlns:a16="http://schemas.microsoft.com/office/drawing/2014/main" id="{175001E9-0D5B-864B-AB16-328450214CEC}"/>
-              </a:ext>
-            </a:extLst>
-          </p:cNvPr>
-          <p:cNvSpPr txBox="1"/>
-          <p:nvPr/>
-        </p:nvSpPr>
-        <p:spPr>
-          <a:xfrm>
-            <a:off x="7382933" y="4464925"/>
-            <a:ext cx="5644445" cy="1323439"/>
-          </a:xfrm>
-          <a:prstGeom prst="rect">
-            <a:avLst/>
-          </a:prstGeom>
-          <a:noFill/>
-        </p:spPr>
-        <p:txBody>
-          <a:bodyPr wrap="square">
-            <a:spAutoFit/>
-          </a:bodyPr>
-          <a:lstStyle/>
-          <a:p>
-            <a:pPr marL="0" marR="0" algn="l">
-              <a:spcBef>
-                <a:spcPts val="0"/>
-              </a:spcBef>
-              <a:spcAft>
-                <a:spcPts val="0"/>
-              </a:spcAft>
-            </a:pPr>
-            <a:r>
-              <a:rPr lang="en-US" sz="2000" b="0" i="0" u="none" strike="noStrike" dirty="0">
-                <a:solidFill>
-                  <a:srgbClr val="000000"/>
-                </a:solidFill>
-                <a:effectLst/>
-                <a:latin typeface="Calibri" panose="020F0502020204030204" pitchFamily="34" charset="0"/>
+              <a:t>Help Sessions</a:t>
+            </a:r>
+          </a:p>
+          <a:p>
+            <a:pPr lvl="1"/>
+            <a:r>
+              <a:rPr lang="en-US" dirty="0"/>
+              <a:t>Go to them! They make a difference</a:t>
+            </a:r>
+          </a:p>
+          <a:p>
+            <a:pPr lvl="1"/>
+            <a:r>
+              <a:rPr lang="en-US" dirty="0"/>
+              <a:t>Help session teams should be setup</a:t>
+            </a:r>
+          </a:p>
+          <a:p>
+            <a:pPr lvl="2"/>
+            <a:r>
+              <a:rPr lang="en-US" dirty="0">
+                <a:solidFill>
+                  <a:srgbClr val="092529"/>
+                </a:solidFill>
               </a:rPr>
-              <a:t>ACM-W Diversity in Computing Dinner</a:t>
-            </a:r>
-          </a:p>
-          <a:p>
-            <a:pPr marL="0" marR="0" algn="l">
-              <a:spcBef>
-                <a:spcPts val="0"/>
-              </a:spcBef>
-              <a:spcAft>
-                <a:spcPts val="0"/>
-              </a:spcAft>
-            </a:pPr>
-            <a:r>
-              <a:rPr lang="en-US" sz="2000" b="0" i="0" u="none" strike="noStrike" dirty="0">
-                <a:solidFill>
-                  <a:srgbClr val="000000"/>
-                </a:solidFill>
-                <a:effectLst/>
-                <a:latin typeface="Calibri" panose="020F0502020204030204" pitchFamily="34" charset="0"/>
+              <a:t>If you are not on a private </a:t>
+            </a:r>
+            <a:r>
+              <a:rPr lang="en-US" dirty="0"/>
+              <a:t>channel with your other help session team mates, let us know </a:t>
+            </a:r>
+          </a:p>
+          <a:p>
+            <a:r>
+              <a:rPr lang="en-US" dirty="0">
+                <a:solidFill>
+                  <a:srgbClr val="092529"/>
+                </a:solidFill>
               </a:rPr>
-              <a:t>When: Thursday September 16</a:t>
-            </a:r>
-            <a:r>
-              <a:rPr lang="en-US" sz="2000" b="0" i="0" u="none" strike="noStrike" baseline="30000" dirty="0">
-                <a:solidFill>
-                  <a:srgbClr val="000000"/>
-                </a:solidFill>
-                <a:effectLst/>
-                <a:latin typeface="Calibri" panose="020F0502020204030204" pitchFamily="34" charset="0"/>
+              <a:t>Thursday </a:t>
+            </a:r>
+            <a:r>
+              <a:rPr lang="en-US" dirty="0"/>
+              <a:t>lab – meant to be done by Tuesday</a:t>
+            </a:r>
+            <a:r>
+              <a:rPr lang="en-US" dirty="0">
+                <a:solidFill>
+                  <a:srgbClr val="092529"/>
+                </a:solidFill>
               </a:rPr>
-              <a:t>th</a:t>
-            </a:r>
-            <a:r>
-              <a:rPr lang="en-US" sz="2000" b="0" i="0" u="none" strike="noStrike" dirty="0">
-                <a:solidFill>
-                  <a:srgbClr val="000000"/>
-                </a:solidFill>
-                <a:effectLst/>
-                <a:latin typeface="Calibri" panose="020F0502020204030204" pitchFamily="34" charset="0"/>
-              </a:rPr>
-              <a:t> at 5:30pm</a:t>
-            </a:r>
-          </a:p>
-          <a:p>
-            <a:pPr marL="0" marR="0" algn="l">
-              <a:spcBef>
-                <a:spcPts val="0"/>
-              </a:spcBef>
-              <a:spcAft>
-                <a:spcPts val="0"/>
-              </a:spcAft>
-            </a:pPr>
-            <a:r>
-              <a:rPr lang="en-US" sz="2000" b="0" i="0" u="none" strike="noStrike" dirty="0">
-                <a:solidFill>
-                  <a:srgbClr val="000000"/>
-                </a:solidFill>
-                <a:effectLst/>
-                <a:latin typeface="Calibri" panose="020F0502020204030204" pitchFamily="34" charset="0"/>
-              </a:rPr>
-              <a:t>Where: LSC room 382</a:t>
-            </a:r>
-          </a:p>
-          <a:p>
-            <a:pPr marL="0" marR="0" algn="l">
-              <a:spcBef>
-                <a:spcPts val="0"/>
-              </a:spcBef>
-              <a:spcAft>
-                <a:spcPts val="0"/>
-              </a:spcAft>
-            </a:pPr>
-            <a:r>
-              <a:rPr lang="en-US" sz="2000" b="0" i="0" u="none" strike="noStrike" dirty="0">
-                <a:solidFill>
-                  <a:srgbClr val="000000"/>
-                </a:solidFill>
-                <a:effectLst/>
-                <a:latin typeface="Calibri" panose="020F0502020204030204" pitchFamily="34" charset="0"/>
-              </a:rPr>
-              <a:t>RSVP: </a:t>
-            </a:r>
-            <a:r>
-              <a:rPr lang="en-US" sz="2000" b="0" i="0" u="none" strike="noStrike" dirty="0">
-                <a:solidFill>
-                  <a:srgbClr val="000000"/>
-                </a:solidFill>
-                <a:effectLst/>
-                <a:latin typeface="Calibri" panose="020F0502020204030204" pitchFamily="34" charset="0"/>
-                <a:hlinkClick r:id="rId4" tooltip="Original URL:&#10;https://forms.gle/LdDiVAPaui5Ctgw38&#10;&#10;Click to follow link."/>
-              </a:rPr>
-              <a:t>https://forms.gle/LdDiVAPaui5Ctgw38</a:t>
-            </a:r>
-            <a:endParaRPr lang="en-US" sz="2000" b="0" i="0" u="none" strike="noStrike" dirty="0">
-              <a:solidFill>
-                <a:srgbClr val="000000"/>
-              </a:solidFill>
-              <a:effectLst/>
-              <a:latin typeface="Calibri" panose="020F0502020204030204" pitchFamily="34" charset="0"/>
-            </a:endParaRPr>
+              <a:t> </a:t>
+            </a:r>
           </a:p>
         </p:txBody>
       </p:sp>
@@ -7399,7 +7351,7 @@
         <p:spPr>
           <a:xfrm>
             <a:off x="6784622" y="598311"/>
-            <a:ext cx="6404903" cy="1015663"/>
+            <a:ext cx="6404903" cy="1323439"/>
           </a:xfrm>
           <a:prstGeom prst="rect">
             <a:avLst/>
@@ -7422,7 +7374,104 @@
           <a:p>
             <a:r>
               <a:rPr lang="en-US" dirty="0"/>
-              <a:t>Try to explain a coding concept to someone else at the table. </a:t>
+              <a:t>Try to explain how to make PB&amp;J Sandwich. How many steps does it take? Did you really include all steps?</a:t>
+            </a:r>
+          </a:p>
+        </p:txBody>
+      </p:sp>
+      <p:sp>
+        <p:nvSpPr>
+          <p:cNvPr id="11" name="TextBox 10">
+            <a:extLst>
+              <a:ext uri="{FF2B5EF4-FFF2-40B4-BE49-F238E27FC236}">
+                <a16:creationId xmlns:a16="http://schemas.microsoft.com/office/drawing/2014/main" id="{FA3CB613-EBA6-4359-A445-864A318E088C}"/>
+              </a:ext>
+            </a:extLst>
+          </p:cNvPr>
+          <p:cNvSpPr txBox="1"/>
+          <p:nvPr/>
+        </p:nvSpPr>
+        <p:spPr>
+          <a:xfrm>
+            <a:off x="8075364" y="6616455"/>
+            <a:ext cx="5668178" cy="707886"/>
+          </a:xfrm>
+          <a:prstGeom prst="rect">
+            <a:avLst/>
+          </a:prstGeom>
+          <a:noFill/>
+        </p:spPr>
+        <p:txBody>
+          <a:bodyPr wrap="square">
+            <a:spAutoFit/>
+          </a:bodyPr>
+          <a:lstStyle/>
+          <a:p>
+            <a:pPr marL="0" marR="0">
+              <a:spcBef>
+                <a:spcPts val="0"/>
+              </a:spcBef>
+              <a:spcAft>
+                <a:spcPts val="0"/>
+              </a:spcAft>
+            </a:pPr>
+            <a:r>
+              <a:rPr lang="en-US" sz="2000" dirty="0">
+                <a:effectLst/>
+                <a:latin typeface="Calibri" panose="020F0502020204030204" pitchFamily="34" charset="0"/>
+                <a:ea typeface="Calibri" panose="020F0502020204030204" pitchFamily="34" charset="0"/>
+              </a:rPr>
+              <a:t>February 2</a:t>
+            </a:r>
+            <a:r>
+              <a:rPr lang="en-US" sz="2000" baseline="30000" dirty="0">
+                <a:effectLst/>
+                <a:latin typeface="Calibri" panose="020F0502020204030204" pitchFamily="34" charset="0"/>
+                <a:ea typeface="Calibri" panose="020F0502020204030204" pitchFamily="34" charset="0"/>
+              </a:rPr>
+              <a:t>nd</a:t>
+            </a:r>
+            <a:r>
+              <a:rPr lang="en-US" sz="2000" dirty="0">
+                <a:effectLst/>
+                <a:latin typeface="Calibri" panose="020F0502020204030204" pitchFamily="34" charset="0"/>
+                <a:ea typeface="Calibri" panose="020F0502020204030204" pitchFamily="34" charset="0"/>
+              </a:rPr>
+              <a:t> : ACM – Presentation: Tech Interviews</a:t>
+            </a:r>
+          </a:p>
+          <a:p>
+            <a:pPr marL="0" marR="0">
+              <a:spcBef>
+                <a:spcPts val="0"/>
+              </a:spcBef>
+              <a:spcAft>
+                <a:spcPts val="0"/>
+              </a:spcAft>
+            </a:pPr>
+            <a:r>
+              <a:rPr lang="en-US" sz="2000" dirty="0">
+                <a:effectLst/>
+                <a:latin typeface="Calibri" panose="020F0502020204030204" pitchFamily="34" charset="0"/>
+                <a:ea typeface="Calibri" panose="020F0502020204030204" pitchFamily="34" charset="0"/>
+              </a:rPr>
+              <a:t>February 3</a:t>
+            </a:r>
+            <a:r>
+              <a:rPr lang="en-US" sz="2000" baseline="30000" dirty="0">
+                <a:effectLst/>
+                <a:latin typeface="Calibri" panose="020F0502020204030204" pitchFamily="34" charset="0"/>
+                <a:ea typeface="Calibri" panose="020F0502020204030204" pitchFamily="34" charset="0"/>
+              </a:rPr>
+              <a:t>rd</a:t>
+            </a:r>
+            <a:r>
+              <a:rPr lang="en-US" sz="2000" dirty="0">
+                <a:effectLst/>
+                <a:latin typeface="Calibri" panose="020F0502020204030204" pitchFamily="34" charset="0"/>
+                <a:ea typeface="Calibri" panose="020F0502020204030204" pitchFamily="34" charset="0"/>
+              </a:rPr>
+              <a:t> : ACM-W – Career Fair Prep</a:t>
             </a:r>
           </a:p>
         </p:txBody>
@@ -7453,6 +7502,121 @@
 </file>
 
 <file path=ppt/slides/slide3.xml><?xml version="1.0" encoding="utf-8"?>
+<p:sld xmlns:a="http://schemas.openxmlformats.org/drawingml/2006/main" xmlns:r="http://schemas.openxmlformats.org/officeDocument/2006/relationships" xmlns:p="http://schemas.openxmlformats.org/presentationml/2006/main" show="0">
+  <p:cSld>
+    <p:spTree>
+      <p:nvGrpSpPr>
+        <p:cNvPr id="1" name=""/>
+        <p:cNvGrpSpPr/>
+        <p:nvPr/>
+      </p:nvGrpSpPr>
+      <p:grpSpPr>
+        <a:xfrm>
+          <a:off x="0" y="0"/>
+          <a:ext cx="0" cy="0"/>
+          <a:chOff x="0" y="0"/>
+          <a:chExt cx="0" cy="0"/>
+        </a:xfrm>
+      </p:grpSpPr>
+      <p:sp>
+        <p:nvSpPr>
+          <p:cNvPr id="2" name="Title 1">
+            <a:extLst>
+              <a:ext uri="{FF2B5EF4-FFF2-40B4-BE49-F238E27FC236}">
+                <a16:creationId xmlns:a16="http://schemas.microsoft.com/office/drawing/2014/main" id="{02C911C1-6C62-364F-8564-3853A1FF95AE}"/>
+              </a:ext>
+            </a:extLst>
+          </p:cNvPr>
+          <p:cNvSpPr>
+            <a:spLocks noGrp="1"/>
+          </p:cNvSpPr>
+          <p:nvPr>
+            <p:ph type="title"/>
+          </p:nvPr>
+        </p:nvSpPr>
+        <p:spPr/>
+        <p:txBody>
+          <a:bodyPr/>
+          <a:lstStyle/>
+          <a:p>
+            <a:r>
+              <a:rPr lang="en-US" dirty="0"/>
+              <a:t>Discussion</a:t>
+            </a:r>
+          </a:p>
+        </p:txBody>
+      </p:sp>
+      <p:sp>
+        <p:nvSpPr>
+          <p:cNvPr id="3" name="Text Placeholder 2">
+            <a:extLst>
+              <a:ext uri="{FF2B5EF4-FFF2-40B4-BE49-F238E27FC236}">
+                <a16:creationId xmlns:a16="http://schemas.microsoft.com/office/drawing/2014/main" id="{B7E35B54-2238-6B44-92D9-4148B12D81FC}"/>
+              </a:ext>
+            </a:extLst>
+          </p:cNvPr>
+          <p:cNvSpPr>
+            <a:spLocks noGrp="1"/>
+          </p:cNvSpPr>
+          <p:nvPr>
+            <p:ph type="body" sz="quarter" idx="10"/>
+          </p:nvPr>
+        </p:nvSpPr>
+        <p:spPr>
+          <a:xfrm>
+            <a:off x="628075" y="1776683"/>
+            <a:ext cx="12561453" cy="1453924"/>
+          </a:xfrm>
+        </p:spPr>
+        <p:txBody>
+          <a:bodyPr/>
+          <a:lstStyle/>
+          <a:p>
+            <a:r>
+              <a:rPr lang="en-US" dirty="0"/>
+              <a:t>Who did you interview for the paper?</a:t>
+            </a:r>
+          </a:p>
+          <a:p>
+            <a:r>
+              <a:rPr lang="en-US" dirty="0"/>
+              <a:t>What did you learn?</a:t>
+            </a:r>
+          </a:p>
+          <a:p>
+            <a:r>
+              <a:rPr lang="en-US" dirty="0"/>
+              <a:t>What are some commonalities between the interviews at your table?</a:t>
+            </a:r>
+          </a:p>
+        </p:txBody>
+      </p:sp>
+    </p:spTree>
+    <p:extLst>
+      <p:ext uri="{BB962C8B-B14F-4D97-AF65-F5344CB8AC3E}">
+        <p14:creationId xmlns:p14="http://schemas.microsoft.com/office/powerpoint/2010/main" val="3433213120"/>
+      </p:ext>
+    </p:extLst>
+  </p:cSld>
+  <p:clrMapOvr>
+    <a:masterClrMapping/>
+  </p:clrMapOvr>
+  <mc:AlternateContent xmlns:mc="http://schemas.openxmlformats.org/markup-compatibility/2006">
+    <mc:Choice xmlns:p14="http://schemas.microsoft.com/office/powerpoint/2010/main" Requires="p14">
+      <p:transition p14:dur="300">
+        <p:fade/>
+      </p:transition>
+    </mc:Choice>
+    <mc:Fallback>
+      <p:transition>
+        <p:fade/>
+      </p:transition>
+    </mc:Fallback>
+  </mc:AlternateContent>
+</p:sld>
+</file>
+
+<file path=ppt/slides/slide4.xml><?xml version="1.0" encoding="utf-8"?>
 <p:sld xmlns:a="http://schemas.openxmlformats.org/drawingml/2006/main" xmlns:r="http://schemas.openxmlformats.org/officeDocument/2006/relationships" xmlns:p="http://schemas.openxmlformats.org/presentationml/2006/main">
   <p:cSld>
     <p:spTree>
@@ -7525,7 +7689,7 @@
           <a:p>
             <a:r>
               <a:rPr lang="en-US" dirty="0"/>
-              <a:t>Who did you interview for the paper?</a:t>
+              <a:t>What topics did you pick? What was the inspiration for it? </a:t>
             </a:r>
           </a:p>
           <a:p>
@@ -7545,187 +7709,7 @@
     </p:spTree>
     <p:extLst>
       <p:ext uri="{BB962C8B-B14F-4D97-AF65-F5344CB8AC3E}">
-        <p14:creationId xmlns:p14="http://schemas.microsoft.com/office/powerpoint/2010/main" val="3433213120"/>
-      </p:ext>
-    </p:extLst>
-  </p:cSld>
-  <p:clrMapOvr>
-    <a:masterClrMapping/>
-  </p:clrMapOvr>
-  <mc:AlternateContent xmlns:mc="http://schemas.openxmlformats.org/markup-compatibility/2006" xmlns:p14="http://schemas.microsoft.com/office/powerpoint/2010/main">
-    <mc:Choice Requires="p14">
-      <p:transition p14:dur="300">
-        <p:fade/>
-      </p:transition>
-    </mc:Choice>
-    <mc:Fallback xmlns="">
-      <p:transition>
-        <p:fade/>
-      </p:transition>
-    </mc:Fallback>
-  </mc:AlternateContent>
-</p:sld>
-</file>
-
-<file path=ppt/slides/slide4.xml><?xml version="1.0" encoding="utf-8"?>
-<p:sld xmlns:a="http://schemas.openxmlformats.org/drawingml/2006/main" xmlns:r="http://schemas.openxmlformats.org/officeDocument/2006/relationships" xmlns:p="http://schemas.openxmlformats.org/presentationml/2006/main">
-  <p:cSld>
-    <p:spTree>
-      <p:nvGrpSpPr>
-        <p:cNvPr id="1" name=""/>
-        <p:cNvGrpSpPr/>
-        <p:nvPr/>
-      </p:nvGrpSpPr>
-      <p:grpSpPr>
-        <a:xfrm>
-          <a:off x="0" y="0"/>
-          <a:ext cx="0" cy="0"/>
-          <a:chOff x="0" y="0"/>
-          <a:chExt cx="0" cy="0"/>
-        </a:xfrm>
-      </p:grpSpPr>
-      <p:sp>
-        <p:nvSpPr>
-          <p:cNvPr id="4" name="Title 3">
-            <a:extLst>
-              <a:ext uri="{FF2B5EF4-FFF2-40B4-BE49-F238E27FC236}">
-                <a16:creationId xmlns:a16="http://schemas.microsoft.com/office/drawing/2014/main" id="{5E039D6A-04E8-1743-9CDF-E8FA80C1D03A}"/>
-              </a:ext>
-            </a:extLst>
-          </p:cNvPr>
-          <p:cNvSpPr>
-            <a:spLocks noGrp="1"/>
-          </p:cNvSpPr>
-          <p:nvPr>
-            <p:ph type="title"/>
-          </p:nvPr>
-        </p:nvSpPr>
-        <p:spPr/>
-        <p:txBody>
-          <a:bodyPr/>
-          <a:lstStyle/>
-          <a:p>
-            <a:r>
-              <a:rPr lang="en-US" dirty="0"/>
-              <a:t>A Couple Reminders</a:t>
-            </a:r>
-          </a:p>
-        </p:txBody>
-      </p:sp>
-      <p:sp>
-        <p:nvSpPr>
-          <p:cNvPr id="5" name="Text Placeholder 4">
-            <a:extLst>
-              <a:ext uri="{FF2B5EF4-FFF2-40B4-BE49-F238E27FC236}">
-                <a16:creationId xmlns:a16="http://schemas.microsoft.com/office/drawing/2014/main" id="{A0CE146B-9D1B-CA43-81BC-F5C79A2C2864}"/>
-              </a:ext>
-            </a:extLst>
-          </p:cNvPr>
-          <p:cNvSpPr>
-            <a:spLocks noGrp="1"/>
-          </p:cNvSpPr>
-          <p:nvPr>
-            <p:ph type="body" sz="quarter" idx="10"/>
-          </p:nvPr>
-        </p:nvSpPr>
-        <p:spPr>
-          <a:xfrm>
-            <a:off x="628075" y="1569403"/>
-            <a:ext cx="12561453" cy="3315972"/>
-          </a:xfrm>
-        </p:spPr>
-        <p:txBody>
-          <a:bodyPr/>
-          <a:lstStyle/>
-          <a:p>
-            <a:r>
-              <a:rPr lang="en-US" dirty="0"/>
-              <a:t>Your first paper, “Why Computer Science” is due this module! </a:t>
-            </a:r>
-          </a:p>
-          <a:p>
-            <a:pPr lvl="1"/>
-            <a:r>
-              <a:rPr lang="en-US" dirty="0"/>
-              <a:t>Hopefully, you already started!</a:t>
-            </a:r>
-          </a:p>
-          <a:p>
-            <a:r>
-              <a:rPr lang="en-US" dirty="0"/>
-              <a:t>Three parts: </a:t>
-            </a:r>
-          </a:p>
-          <a:p>
-            <a:pPr lvl="1"/>
-            <a:r>
-              <a:rPr lang="en-US" dirty="0"/>
-              <a:t>Your Interview</a:t>
-            </a:r>
-          </a:p>
-          <a:p>
-            <a:pPr lvl="1"/>
-            <a:r>
-              <a:rPr lang="en-US" dirty="0"/>
-              <a:t>Why you are interested in CS</a:t>
-            </a:r>
-          </a:p>
-          <a:p>
-            <a:pPr lvl="1"/>
-            <a:r>
-              <a:rPr lang="en-US" dirty="0"/>
-              <a:t>One area of CS that interests you</a:t>
-            </a:r>
-          </a:p>
-          <a:p>
-            <a:pPr lvl="2"/>
-            <a:r>
-              <a:rPr lang="en-US" dirty="0"/>
-              <a:t>with at least one citation to a source (yes, training you for citing sources)</a:t>
-            </a:r>
-          </a:p>
-          <a:p>
-            <a:r>
-              <a:rPr lang="en-US" dirty="0"/>
-              <a:t>Follow the Rubric: (in canvas)</a:t>
-            </a:r>
-          </a:p>
-        </p:txBody>
-      </p:sp>
-      <p:pic>
-        <p:nvPicPr>
-          <p:cNvPr id="6" name="Picture 5">
-            <a:extLst>
-              <a:ext uri="{FF2B5EF4-FFF2-40B4-BE49-F238E27FC236}">
-                <a16:creationId xmlns:a16="http://schemas.microsoft.com/office/drawing/2014/main" id="{9E107E14-252C-1843-AB95-A11F4F382DD5}"/>
-              </a:ext>
-            </a:extLst>
-          </p:cNvPr>
-          <p:cNvPicPr>
-            <a:picLocks noChangeAspect="1"/>
-          </p:cNvPicPr>
-          <p:nvPr/>
-        </p:nvPicPr>
-        <p:blipFill>
-          <a:blip r:embed="rId2"/>
-          <a:stretch>
-            <a:fillRect/>
-          </a:stretch>
-        </p:blipFill>
-        <p:spPr>
-          <a:xfrm>
-            <a:off x="2010127" y="4885375"/>
-            <a:ext cx="3845890" cy="2231686"/>
-          </a:xfrm>
-          <a:prstGeom prst="rect">
-            <a:avLst/>
-          </a:prstGeom>
-        </p:spPr>
-      </p:pic>
-    </p:spTree>
-    <p:extLst>
-      <p:ext uri="{BB962C8B-B14F-4D97-AF65-F5344CB8AC3E}">
-        <p14:creationId xmlns:p14="http://schemas.microsoft.com/office/powerpoint/2010/main" val="1434849302"/>
+        <p14:creationId xmlns:p14="http://schemas.microsoft.com/office/powerpoint/2010/main" val="2187946889"/>
       </p:ext>
     </p:extLst>
   </p:cSld>
@@ -7766,10 +7750,10 @@
       </p:grpSpPr>
       <p:sp>
         <p:nvSpPr>
-          <p:cNvPr id="2" name="Title 1">
+          <p:cNvPr id="4" name="Title 3">
             <a:extLst>
               <a:ext uri="{FF2B5EF4-FFF2-40B4-BE49-F238E27FC236}">
-                <a16:creationId xmlns:a16="http://schemas.microsoft.com/office/drawing/2014/main" id="{6D50846F-8AE1-5747-A2A6-02BB1AA816D4}"/>
+                <a16:creationId xmlns:a16="http://schemas.microsoft.com/office/drawing/2014/main" id="{5E039D6A-04E8-1743-9CDF-E8FA80C1D03A}"/>
               </a:ext>
             </a:extLst>
           </p:cNvPr>
@@ -7787,17 +7771,17 @@
           <a:p>
             <a:r>
               <a:rPr lang="en-US" dirty="0"/>
-              <a:t>Grading</a:t>
+              <a:t>A Couple Reminders</a:t>
             </a:r>
           </a:p>
         </p:txBody>
       </p:sp>
       <p:sp>
         <p:nvSpPr>
-          <p:cNvPr id="3" name="Text Placeholder 2">
+          <p:cNvPr id="5" name="Text Placeholder 4">
             <a:extLst>
               <a:ext uri="{FF2B5EF4-FFF2-40B4-BE49-F238E27FC236}">
-                <a16:creationId xmlns:a16="http://schemas.microsoft.com/office/drawing/2014/main" id="{03F7F41E-67AC-2048-BF71-0ED91D60FB56}"/>
+                <a16:creationId xmlns:a16="http://schemas.microsoft.com/office/drawing/2014/main" id="{A0CE146B-9D1B-CA43-81BC-F5C79A2C2864}"/>
               </a:ext>
             </a:extLst>
           </p:cNvPr>
@@ -7810,8 +7794,8 @@
         </p:nvSpPr>
         <p:spPr>
           <a:xfrm>
-            <a:off x="628075" y="1463722"/>
-            <a:ext cx="12561453" cy="5068054"/>
+            <a:off x="628075" y="1569403"/>
+            <a:ext cx="12561453" cy="1716432"/>
           </a:xfrm>
         </p:spPr>
         <p:txBody>
@@ -7820,98 +7804,65 @@
           <a:p>
             <a:r>
               <a:rPr lang="en-US" dirty="0"/>
-              <a:t>Every Learning Outcome In Rubric</a:t>
+              <a:t>Your first paper, is due this module! </a:t>
             </a:r>
           </a:p>
           <a:p>
             <a:pPr lvl="1"/>
             <a:r>
               <a:rPr lang="en-US" dirty="0"/>
-              <a:t>Scored between 1-4</a:t>
+              <a:t>Hopefully, you already started!</a:t>
+            </a:r>
+          </a:p>
+          <a:p>
+            <a:r>
+              <a:rPr lang="en-US" dirty="0"/>
+              <a:t>Follow the Rubric: (in canvas)</a:t>
             </a:r>
           </a:p>
           <a:p>
             <a:pPr lvl="1"/>
             <a:r>
               <a:rPr lang="en-US" dirty="0"/>
-              <a:t>0 if you skip that learning outcome completely</a:t>
-            </a:r>
-          </a:p>
-          <a:p>
-            <a:r>
-              <a:rPr lang="en-US" dirty="0"/>
-              <a:t>Final grade for paper 1-4</a:t>
-            </a:r>
-          </a:p>
-          <a:p>
-            <a:pPr lvl="1"/>
-            <a:r>
-              <a:rPr lang="en-US" dirty="0"/>
-              <a:t>Based on most scores you have (rounded up)</a:t>
-            </a:r>
-          </a:p>
-          <a:p>
-            <a:pPr lvl="1"/>
-            <a:r>
-              <a:rPr lang="en-US" dirty="0"/>
-              <a:t>For example</a:t>
-            </a:r>
-          </a:p>
-          <a:p>
-            <a:pPr lvl="2"/>
-            <a:r>
-              <a:rPr lang="en-US" dirty="0"/>
-              <a:t>4, 4, 3, 3 = 4 for the paper</a:t>
-            </a:r>
-          </a:p>
-          <a:p>
-            <a:pPr lvl="2"/>
-            <a:r>
-              <a:rPr lang="en-US" dirty="0"/>
-              <a:t>4, 3, 3, 2 = 3 for the paper</a:t>
-            </a:r>
-          </a:p>
-          <a:p>
-            <a:pPr lvl="1"/>
-            <a:r>
-              <a:rPr lang="en-US" dirty="0"/>
-              <a:t>Exception:</a:t>
-            </a:r>
-          </a:p>
-          <a:p>
-            <a:pPr lvl="2"/>
-            <a:r>
-              <a:rPr lang="en-US" dirty="0"/>
-              <a:t>If you score a 1 or 2 in any category, you may not score a 4 for the total!</a:t>
-            </a:r>
-          </a:p>
-          <a:p>
-            <a:pPr lvl="1"/>
-            <a:r>
-              <a:rPr lang="en-US" dirty="0"/>
-              <a:t>Submitting a blank page, will grant you a 0</a:t>
-            </a:r>
-          </a:p>
-          <a:p>
-            <a:pPr lvl="2"/>
-            <a:r>
-              <a:rPr lang="en-US" dirty="0"/>
-              <a:t>But allowed, if you want to ‘skip’ the paper</a:t>
-            </a:r>
-          </a:p>
-          <a:p>
-            <a:pPr lvl="2"/>
-            <a:r>
-              <a:rPr lang="en-US" dirty="0"/>
-              <a:t>Don’t skip it! (Will seriously damage your grade) </a:t>
+              <a:t>Most common mistake: not using references!</a:t>
             </a:r>
           </a:p>
         </p:txBody>
       </p:sp>
+      <p:pic>
+        <p:nvPicPr>
+          <p:cNvPr id="6" name="Picture 5">
+            <a:extLst>
+              <a:ext uri="{FF2B5EF4-FFF2-40B4-BE49-F238E27FC236}">
+                <a16:creationId xmlns:a16="http://schemas.microsoft.com/office/drawing/2014/main" id="{9E107E14-252C-1843-AB95-A11F4F382DD5}"/>
+              </a:ext>
+            </a:extLst>
+          </p:cNvPr>
+          <p:cNvPicPr>
+            <a:picLocks noChangeAspect="1"/>
+          </p:cNvPicPr>
+          <p:nvPr/>
+        </p:nvPicPr>
+        <p:blipFill>
+          <a:blip r:embed="rId2"/>
+          <a:stretch>
+            <a:fillRect/>
+          </a:stretch>
+        </p:blipFill>
+        <p:spPr>
+          <a:xfrm>
+            <a:off x="7066869" y="2825219"/>
+            <a:ext cx="6594046" cy="3826381"/>
+          </a:xfrm>
+          <a:prstGeom prst="rect">
+            <a:avLst/>
+          </a:prstGeom>
+        </p:spPr>
+      </p:pic>
     </p:spTree>
     <p:extLst>
       <p:ext uri="{BB962C8B-B14F-4D97-AF65-F5344CB8AC3E}">
-        <p14:creationId xmlns:p14="http://schemas.microsoft.com/office/powerpoint/2010/main" val="2000830626"/>
+        <p14:creationId xmlns:p14="http://schemas.microsoft.com/office/powerpoint/2010/main" val="1434849302"/>
       </p:ext>
     </p:extLst>
   </p:cSld>
@@ -7955,7 +7906,7 @@
           <p:cNvPr id="2" name="Title 1">
             <a:extLst>
               <a:ext uri="{FF2B5EF4-FFF2-40B4-BE49-F238E27FC236}">
-                <a16:creationId xmlns:a16="http://schemas.microsoft.com/office/drawing/2014/main" id="{26B31DF8-521F-C94E-B77C-B984ACB52F7D}"/>
+                <a16:creationId xmlns:a16="http://schemas.microsoft.com/office/drawing/2014/main" id="{6D50846F-8AE1-5747-A2A6-02BB1AA816D4}"/>
               </a:ext>
             </a:extLst>
           </p:cNvPr>
@@ -7973,7 +7924,7 @@
           <a:p>
             <a:r>
               <a:rPr lang="en-US" dirty="0"/>
-              <a:t>Resubmitting?</a:t>
+              <a:t>Grading</a:t>
             </a:r>
           </a:p>
         </p:txBody>
@@ -7983,7 +7934,7 @@
           <p:cNvPr id="3" name="Text Placeholder 2">
             <a:extLst>
               <a:ext uri="{FF2B5EF4-FFF2-40B4-BE49-F238E27FC236}">
-                <a16:creationId xmlns:a16="http://schemas.microsoft.com/office/drawing/2014/main" id="{78B07357-1DC6-6748-8CC4-91B57DCADE4C}"/>
+                <a16:creationId xmlns:a16="http://schemas.microsoft.com/office/drawing/2014/main" id="{03F7F41E-67AC-2048-BF71-0ED91D60FB56}"/>
               </a:ext>
             </a:extLst>
           </p:cNvPr>
@@ -7996,8 +7947,8 @@
         </p:nvSpPr>
         <p:spPr>
           <a:xfrm>
-            <a:off x="628075" y="1776683"/>
-            <a:ext cx="12561453" cy="2198743"/>
+            <a:off x="628075" y="1463722"/>
+            <a:ext cx="12561453" cy="5068054"/>
           </a:xfrm>
         </p:spPr>
         <p:txBody>
@@ -8006,33 +7957,90 @@
           <a:p>
             <a:r>
               <a:rPr lang="en-US" dirty="0"/>
-              <a:t>You must meet with the instructor or TA – first</a:t>
+              <a:t>Every Learning Outcome In Rubric</a:t>
             </a:r>
           </a:p>
           <a:p>
             <a:pPr lvl="1"/>
             <a:r>
               <a:rPr lang="en-US" dirty="0"/>
-              <a:t>They will then regrade your new submission</a:t>
-            </a:r>
-          </a:p>
-          <a:p>
-            <a:r>
-              <a:rPr lang="en-US" dirty="0"/>
-              <a:t>If you score a 1 or 2 on the final paper score (not just a single category)</a:t>
+              <a:t>Scored between 1-4</a:t>
             </a:r>
           </a:p>
           <a:p>
             <a:pPr lvl="1"/>
             <a:r>
               <a:rPr lang="en-US" dirty="0"/>
-              <a:t>you will automatically be asked to re-submit</a:t>
-            </a:r>
-          </a:p>
-          <a:p>
-            <a:r>
-              <a:rPr lang="en-US" dirty="0"/>
-              <a:t>The goal is for you to do it correctly, more than just doing it! </a:t>
+              <a:t>0 if you skip that learning outcome completely</a:t>
+            </a:r>
+          </a:p>
+          <a:p>
+            <a:r>
+              <a:rPr lang="en-US" dirty="0"/>
+              <a:t>Final grade for paper 1-4</a:t>
+            </a:r>
+          </a:p>
+          <a:p>
+            <a:pPr lvl="1"/>
+            <a:r>
+              <a:rPr lang="en-US" dirty="0"/>
+              <a:t>Based on most scores you have (rounded up)</a:t>
+            </a:r>
+          </a:p>
+          <a:p>
+            <a:pPr lvl="1"/>
+            <a:r>
+              <a:rPr lang="en-US" dirty="0"/>
+              <a:t>For example</a:t>
+            </a:r>
+          </a:p>
+          <a:p>
+            <a:pPr lvl="2"/>
+            <a:r>
+              <a:rPr lang="en-US" dirty="0"/>
+              <a:t>4, 4, 3, 3 = 4 for the paper</a:t>
+            </a:r>
+          </a:p>
+          <a:p>
+            <a:pPr lvl="2"/>
+            <a:r>
+              <a:rPr lang="en-US" dirty="0"/>
+              <a:t>4, 3, 3, 2 = 3 for the paper</a:t>
+            </a:r>
+          </a:p>
+          <a:p>
+            <a:pPr lvl="1"/>
+            <a:r>
+              <a:rPr lang="en-US" dirty="0"/>
+              <a:t>Exception:</a:t>
+            </a:r>
+          </a:p>
+          <a:p>
+            <a:pPr lvl="2"/>
+            <a:r>
+              <a:rPr lang="en-US" dirty="0"/>
+              <a:t>If you score a 1 or 2 in any category, you may not score a 4 for the total!</a:t>
+            </a:r>
+          </a:p>
+          <a:p>
+            <a:pPr lvl="1"/>
+            <a:r>
+              <a:rPr lang="en-US" dirty="0"/>
+              <a:t>Submitting a blank page, will grant you a 0</a:t>
+            </a:r>
+          </a:p>
+          <a:p>
+            <a:pPr lvl="2"/>
+            <a:r>
+              <a:rPr lang="en-US" dirty="0"/>
+              <a:t>But allowed, if you want to ‘skip’ the paper</a:t>
+            </a:r>
+          </a:p>
+          <a:p>
+            <a:pPr lvl="2"/>
+            <a:r>
+              <a:rPr lang="en-US" dirty="0"/>
+              <a:t>Don’t skip it! (Will seriously damage your grade) </a:t>
             </a:r>
           </a:p>
         </p:txBody>
@@ -8040,7 +8048,7 @@
     </p:spTree>
     <p:extLst>
       <p:ext uri="{BB962C8B-B14F-4D97-AF65-F5344CB8AC3E}">
-        <p14:creationId xmlns:p14="http://schemas.microsoft.com/office/powerpoint/2010/main" val="3689486253"/>
+        <p14:creationId xmlns:p14="http://schemas.microsoft.com/office/powerpoint/2010/main" val="2000830626"/>
       </p:ext>
     </p:extLst>
   </p:cSld>
@@ -8084,7 +8092,7 @@
           <p:cNvPr id="2" name="Title 1">
             <a:extLst>
               <a:ext uri="{FF2B5EF4-FFF2-40B4-BE49-F238E27FC236}">
-                <a16:creationId xmlns:a16="http://schemas.microsoft.com/office/drawing/2014/main" id="{128BFA9A-45E6-C442-8CBE-0213CB1B8656}"/>
+                <a16:creationId xmlns:a16="http://schemas.microsoft.com/office/drawing/2014/main" id="{26B31DF8-521F-C94E-B77C-B984ACB52F7D}"/>
               </a:ext>
             </a:extLst>
           </p:cNvPr>
@@ -8102,7 +8110,7 @@
           <a:p>
             <a:r>
               <a:rPr lang="en-US" dirty="0"/>
-              <a:t>FAQ</a:t>
+              <a:t>Resubmitting?</a:t>
             </a:r>
           </a:p>
         </p:txBody>
@@ -8112,7 +8120,7 @@
           <p:cNvPr id="3" name="Text Placeholder 2">
             <a:extLst>
               <a:ext uri="{FF2B5EF4-FFF2-40B4-BE49-F238E27FC236}">
-                <a16:creationId xmlns:a16="http://schemas.microsoft.com/office/drawing/2014/main" id="{223821DE-E740-D84A-80C7-B8740AFDEE7D}"/>
+                <a16:creationId xmlns:a16="http://schemas.microsoft.com/office/drawing/2014/main" id="{78B07357-1DC6-6748-8CC4-91B57DCADE4C}"/>
               </a:ext>
             </a:extLst>
           </p:cNvPr>
@@ -8125,8 +8133,8 @@
         </p:nvSpPr>
         <p:spPr>
           <a:xfrm>
-            <a:off x="628075" y="1463722"/>
-            <a:ext cx="12561453" cy="5291898"/>
+            <a:off x="628075" y="1776683"/>
+            <a:ext cx="12561453" cy="2198743"/>
           </a:xfrm>
         </p:spPr>
         <p:txBody>
@@ -8135,92 +8143,33 @@
           <a:p>
             <a:r>
               <a:rPr lang="en-US" dirty="0"/>
-              <a:t>What type of format?</a:t>
+              <a:t>You must meet with the instructor or TA – first</a:t>
             </a:r>
           </a:p>
           <a:p>
             <a:pPr lvl="1"/>
             <a:r>
               <a:rPr lang="en-US" dirty="0"/>
-              <a:t>You can follow any style you want</a:t>
-            </a:r>
-          </a:p>
-          <a:p>
-            <a:pPr lvl="2"/>
-            <a:r>
-              <a:rPr lang="en-US" dirty="0"/>
-              <a:t>but you must follow a style </a:t>
+              <a:t>They will then regrade your new submission</a:t>
+            </a:r>
+          </a:p>
+          <a:p>
+            <a:r>
+              <a:rPr lang="en-US" dirty="0"/>
+              <a:t>If you score a 1 or 2 on the final paper score (not just a single category)</a:t>
             </a:r>
           </a:p>
           <a:p>
             <a:pPr lvl="1"/>
             <a:r>
               <a:rPr lang="en-US" dirty="0"/>
-              <a:t>Recommended Style: (highly recommended)</a:t>
-            </a:r>
-          </a:p>
-          <a:p>
-            <a:pPr lvl="1"/>
-            <a:r>
-              <a:rPr lang="en-US" dirty="0"/>
-              <a:t>ACM/IEEE Style Guidelines</a:t>
-            </a:r>
-          </a:p>
-          <a:p>
-            <a:pPr lvl="2"/>
-            <a:r>
-              <a:rPr lang="en-US" u="sng" dirty="0">
-                <a:hlinkClick r:id="rId2" tooltip=" (opens in a new window)"/>
-              </a:rPr>
-              <a:t>IEEE Overview - Purdue Online Writing Lab</a:t>
-            </a:r>
-            <a:endParaRPr lang="en-US" u="sng" dirty="0"/>
-          </a:p>
-          <a:p>
-            <a:pPr lvl="2"/>
-            <a:r>
-              <a:rPr lang="en-US" dirty="0"/>
-              <a:t>Includes simple intext and biographical citations</a:t>
-            </a:r>
-          </a:p>
-          <a:p>
-            <a:pPr lvl="2"/>
-            <a:r>
-              <a:rPr lang="en-US" dirty="0"/>
-              <a:t>Very commonly used in tech industries </a:t>
-            </a:r>
-          </a:p>
-          <a:p>
-            <a:r>
-              <a:rPr lang="en-US" dirty="0"/>
-              <a:t>Minimum number of pages?</a:t>
-            </a:r>
-          </a:p>
-          <a:p>
-            <a:pPr lvl="1"/>
-            <a:r>
-              <a:rPr lang="en-US" dirty="0"/>
-              <a:t>We don’t have a minimum, only a maximum / stop reading page</a:t>
-            </a:r>
-          </a:p>
-          <a:p>
-            <a:pPr lvl="1"/>
-            <a:r>
-              <a:rPr lang="en-US" dirty="0"/>
-              <a:t>Most people it will take a couple pages</a:t>
-            </a:r>
-          </a:p>
-          <a:p>
-            <a:r>
-              <a:rPr lang="en-US" dirty="0"/>
-              <a:t>Accommodations Window</a:t>
-            </a:r>
-          </a:p>
-          <a:p>
-            <a:pPr lvl="1"/>
-            <a:r>
-              <a:rPr lang="en-US" dirty="0"/>
-              <a:t>Max of 3 days. We have to be strict, or won’t have time to grade them all</a:t>
+              <a:t>you will automatically be asked to re-submit</a:t>
+            </a:r>
+          </a:p>
+          <a:p>
+            <a:r>
+              <a:rPr lang="en-US" dirty="0"/>
+              <a:t>The goal is for you to do it correctly, more than just doing it! </a:t>
             </a:r>
           </a:p>
         </p:txBody>
@@ -8228,7 +8177,7 @@
     </p:spTree>
     <p:extLst>
       <p:ext uri="{BB962C8B-B14F-4D97-AF65-F5344CB8AC3E}">
-        <p14:creationId xmlns:p14="http://schemas.microsoft.com/office/powerpoint/2010/main" val="1382038132"/>
+        <p14:creationId xmlns:p14="http://schemas.microsoft.com/office/powerpoint/2010/main" val="3689486253"/>
       </p:ext>
     </p:extLst>
   </p:cSld>
@@ -8272,6 +8221,198 @@
           <p:cNvPr id="2" name="Title 1">
             <a:extLst>
               <a:ext uri="{FF2B5EF4-FFF2-40B4-BE49-F238E27FC236}">
+                <a16:creationId xmlns:a16="http://schemas.microsoft.com/office/drawing/2014/main" id="{128BFA9A-45E6-C442-8CBE-0213CB1B8656}"/>
+              </a:ext>
+            </a:extLst>
+          </p:cNvPr>
+          <p:cNvSpPr>
+            <a:spLocks noGrp="1"/>
+          </p:cNvSpPr>
+          <p:nvPr>
+            <p:ph type="title"/>
+          </p:nvPr>
+        </p:nvSpPr>
+        <p:spPr/>
+        <p:txBody>
+          <a:bodyPr/>
+          <a:lstStyle/>
+          <a:p>
+            <a:r>
+              <a:rPr lang="en-US" dirty="0"/>
+              <a:t>FAQ</a:t>
+            </a:r>
+          </a:p>
+        </p:txBody>
+      </p:sp>
+      <p:sp>
+        <p:nvSpPr>
+          <p:cNvPr id="3" name="Text Placeholder 2">
+            <a:extLst>
+              <a:ext uri="{FF2B5EF4-FFF2-40B4-BE49-F238E27FC236}">
+                <a16:creationId xmlns:a16="http://schemas.microsoft.com/office/drawing/2014/main" id="{223821DE-E740-D84A-80C7-B8740AFDEE7D}"/>
+              </a:ext>
+            </a:extLst>
+          </p:cNvPr>
+          <p:cNvSpPr>
+            <a:spLocks noGrp="1"/>
+          </p:cNvSpPr>
+          <p:nvPr>
+            <p:ph type="body" sz="quarter" idx="10"/>
+          </p:nvPr>
+        </p:nvSpPr>
+        <p:spPr>
+          <a:xfrm>
+            <a:off x="628075" y="1463722"/>
+            <a:ext cx="12561453" cy="5181996"/>
+          </a:xfrm>
+        </p:spPr>
+        <p:txBody>
+          <a:bodyPr/>
+          <a:lstStyle/>
+          <a:p>
+            <a:r>
+              <a:rPr lang="en-US" dirty="0"/>
+              <a:t>What type of format?</a:t>
+            </a:r>
+          </a:p>
+          <a:p>
+            <a:pPr lvl="1"/>
+            <a:r>
+              <a:rPr lang="en-US" dirty="0"/>
+              <a:t>You can follow any style you want</a:t>
+            </a:r>
+          </a:p>
+          <a:p>
+            <a:pPr lvl="2"/>
+            <a:r>
+              <a:rPr lang="en-US" dirty="0"/>
+              <a:t>but you must follow a style </a:t>
+            </a:r>
+          </a:p>
+          <a:p>
+            <a:pPr lvl="1"/>
+            <a:r>
+              <a:rPr lang="en-US" dirty="0"/>
+              <a:t>Recommended Style: </a:t>
+            </a:r>
+          </a:p>
+          <a:p>
+            <a:pPr lvl="2"/>
+            <a:r>
+              <a:rPr lang="en-US" dirty="0"/>
+              <a:t>ACM/IEEE Style Guidelines</a:t>
+            </a:r>
+          </a:p>
+          <a:p>
+            <a:pPr lvl="2"/>
+            <a:r>
+              <a:rPr lang="en-US" u="sng" dirty="0">
+                <a:hlinkClick r:id="rId2" tooltip=" (opens in a new window)"/>
+              </a:rPr>
+              <a:t>IEEE Overview - Purdue Online Writing Lab</a:t>
+            </a:r>
+            <a:endParaRPr lang="en-US" u="sng" dirty="0"/>
+          </a:p>
+          <a:p>
+            <a:pPr lvl="2"/>
+            <a:r>
+              <a:rPr lang="en-US" dirty="0"/>
+              <a:t>Includes simple intext and biographical citations</a:t>
+            </a:r>
+          </a:p>
+          <a:p>
+            <a:pPr lvl="2"/>
+            <a:r>
+              <a:rPr lang="en-US" dirty="0"/>
+              <a:t>Very commonly used in tech industries  - </a:t>
+            </a:r>
+            <a:r>
+              <a:rPr lang="en-US" u="sng" dirty="0"/>
+              <a:t>we modify it slightly, still keep double spacing, and font sizing</a:t>
+            </a:r>
+          </a:p>
+          <a:p>
+            <a:r>
+              <a:rPr lang="en-US" dirty="0"/>
+              <a:t>Minimum number of pages?</a:t>
+            </a:r>
+          </a:p>
+          <a:p>
+            <a:pPr lvl="1"/>
+            <a:r>
+              <a:rPr lang="en-US" dirty="0"/>
+              <a:t>We don’t have a minimum, only a maximum / stop reading page</a:t>
+            </a:r>
+          </a:p>
+          <a:p>
+            <a:pPr lvl="1"/>
+            <a:r>
+              <a:rPr lang="en-US" dirty="0"/>
+              <a:t>Most people it will take a couple pages</a:t>
+            </a:r>
+          </a:p>
+          <a:p>
+            <a:r>
+              <a:rPr lang="en-US" dirty="0"/>
+              <a:t>Accommodations Window</a:t>
+            </a:r>
+          </a:p>
+          <a:p>
+            <a:pPr lvl="1"/>
+            <a:r>
+              <a:rPr lang="en-US" dirty="0"/>
+              <a:t>Max of 3 days. We need to be strict, or won’t have time to grade them all</a:t>
+            </a:r>
+          </a:p>
+        </p:txBody>
+      </p:sp>
+    </p:spTree>
+    <p:extLst>
+      <p:ext uri="{BB962C8B-B14F-4D97-AF65-F5344CB8AC3E}">
+        <p14:creationId xmlns:p14="http://schemas.microsoft.com/office/powerpoint/2010/main" val="1382038132"/>
+      </p:ext>
+    </p:extLst>
+  </p:cSld>
+  <p:clrMapOvr>
+    <a:masterClrMapping/>
+  </p:clrMapOvr>
+  <mc:AlternateContent xmlns:mc="http://schemas.openxmlformats.org/markup-compatibility/2006" xmlns:p14="http://schemas.microsoft.com/office/powerpoint/2010/main">
+    <mc:Choice Requires="p14">
+      <p:transition p14:dur="300">
+        <p:fade/>
+      </p:transition>
+    </mc:Choice>
+    <mc:Fallback xmlns="">
+      <p:transition>
+        <p:fade/>
+      </p:transition>
+    </mc:Fallback>
+  </mc:AlternateContent>
+</p:sld>
+</file>
+
+<file path=ppt/slides/slide9.xml><?xml version="1.0" encoding="utf-8"?>
+<p:sld xmlns:a="http://schemas.openxmlformats.org/drawingml/2006/main" xmlns:r="http://schemas.openxmlformats.org/officeDocument/2006/relationships" xmlns:p="http://schemas.openxmlformats.org/presentationml/2006/main" show="0">
+  <p:cSld>
+    <p:spTree>
+      <p:nvGrpSpPr>
+        <p:cNvPr id="1" name=""/>
+        <p:cNvGrpSpPr/>
+        <p:nvPr/>
+      </p:nvGrpSpPr>
+      <p:grpSpPr>
+        <a:xfrm>
+          <a:off x="0" y="0"/>
+          <a:ext cx="0" cy="0"/>
+          <a:chOff x="0" y="0"/>
+          <a:chExt cx="0" cy="0"/>
+        </a:xfrm>
+      </p:grpSpPr>
+      <p:sp>
+        <p:nvSpPr>
+          <p:cNvPr id="2" name="Title 1">
+            <a:extLst>
+              <a:ext uri="{FF2B5EF4-FFF2-40B4-BE49-F238E27FC236}">
                 <a16:creationId xmlns:a16="http://schemas.microsoft.com/office/drawing/2014/main" id="{F4F99169-6657-BE45-83F8-7F5082959E29}"/>
               </a:ext>
             </a:extLst>
@@ -8330,172 +8471,13 @@
   <p:clrMapOvr>
     <a:masterClrMapping/>
   </p:clrMapOvr>
-  <mc:AlternateContent xmlns:mc="http://schemas.openxmlformats.org/markup-compatibility/2006" xmlns:p14="http://schemas.microsoft.com/office/powerpoint/2010/main">
-    <mc:Choice Requires="p14">
+  <mc:AlternateContent xmlns:mc="http://schemas.openxmlformats.org/markup-compatibility/2006">
+    <mc:Choice xmlns:p14="http://schemas.microsoft.com/office/powerpoint/2010/main" Requires="p14">
       <p:transition p14:dur="300">
         <p:fade/>
       </p:transition>
     </mc:Choice>
-    <mc:Fallback xmlns="">
-      <p:transition>
-        <p:fade/>
-      </p:transition>
-    </mc:Fallback>
-  </mc:AlternateContent>
-</p:sld>
-</file>
-
-<file path=ppt/slides/slide9.xml><?xml version="1.0" encoding="utf-8"?>
-<p:sld xmlns:a="http://schemas.openxmlformats.org/drawingml/2006/main" xmlns:r="http://schemas.openxmlformats.org/officeDocument/2006/relationships" xmlns:p="http://schemas.openxmlformats.org/presentationml/2006/main">
-  <p:cSld>
-    <p:spTree>
-      <p:nvGrpSpPr>
-        <p:cNvPr id="1" name=""/>
-        <p:cNvGrpSpPr/>
-        <p:nvPr/>
-      </p:nvGrpSpPr>
-      <p:grpSpPr>
-        <a:xfrm>
-          <a:off x="0" y="0"/>
-          <a:ext cx="0" cy="0"/>
-          <a:chOff x="0" y="0"/>
-          <a:chExt cx="0" cy="0"/>
-        </a:xfrm>
-      </p:grpSpPr>
-      <p:sp>
-        <p:nvSpPr>
-          <p:cNvPr id="4" name="Title 3">
-            <a:extLst>
-              <a:ext uri="{FF2B5EF4-FFF2-40B4-BE49-F238E27FC236}">
-                <a16:creationId xmlns:a16="http://schemas.microsoft.com/office/drawing/2014/main" id="{5AB0F837-3458-D44B-A907-7FE8B69C1A41}"/>
-              </a:ext>
-            </a:extLst>
-          </p:cNvPr>
-          <p:cNvSpPr>
-            <a:spLocks noGrp="1"/>
-          </p:cNvSpPr>
-          <p:nvPr>
-            <p:ph type="title"/>
-          </p:nvPr>
-        </p:nvSpPr>
-        <p:spPr/>
-        <p:txBody>
-          <a:bodyPr/>
-          <a:lstStyle/>
-          <a:p>
-            <a:r>
-              <a:rPr lang="en-US" dirty="0"/>
-              <a:t>Coding Practice / Follow Along</a:t>
-            </a:r>
-          </a:p>
-        </p:txBody>
-      </p:sp>
-      <p:sp>
-        <p:nvSpPr>
-          <p:cNvPr id="5" name="Text Placeholder 4">
-            <a:extLst>
-              <a:ext uri="{FF2B5EF4-FFF2-40B4-BE49-F238E27FC236}">
-                <a16:creationId xmlns:a16="http://schemas.microsoft.com/office/drawing/2014/main" id="{DE647D6A-00E7-624E-B4D8-81F5C67D0ABB}"/>
-              </a:ext>
-            </a:extLst>
-          </p:cNvPr>
-          <p:cNvSpPr>
-            <a:spLocks noGrp="1"/>
-          </p:cNvSpPr>
-          <p:nvPr>
-            <p:ph type="body" sz="quarter" idx="10"/>
-          </p:nvPr>
-        </p:nvSpPr>
-        <p:spPr>
-          <a:xfrm>
-            <a:off x="628075" y="1776683"/>
-            <a:ext cx="12561453" cy="3464538"/>
-          </a:xfrm>
-        </p:spPr>
-        <p:txBody>
-          <a:bodyPr/>
-          <a:lstStyle/>
-          <a:p>
-            <a:r>
-              <a:rPr lang="en-US" dirty="0"/>
-              <a:t>Write a code that</a:t>
-            </a:r>
-          </a:p>
-          <a:p>
-            <a:pPr lvl="1"/>
-            <a:r>
-              <a:rPr lang="en-US" dirty="0"/>
-              <a:t>takes two parameters from the client</a:t>
-            </a:r>
-          </a:p>
-          <a:p>
-            <a:pPr lvl="2"/>
-            <a:r>
-              <a:rPr lang="en-US" dirty="0"/>
-              <a:t>a name, and then number</a:t>
-            </a:r>
-          </a:p>
-          <a:p>
-            <a:pPr lvl="1"/>
-            <a:r>
-              <a:rPr lang="en-US" dirty="0"/>
-              <a:t>It then prints out the name and number separated by a comma</a:t>
-            </a:r>
-          </a:p>
-          <a:p>
-            <a:pPr lvl="1"/>
-            <a:r>
-              <a:rPr lang="en-US" dirty="0"/>
-              <a:t>The number should only have at most two decimal places. </a:t>
-            </a:r>
-          </a:p>
-          <a:p>
-            <a:pPr lvl="2"/>
-            <a:r>
-              <a:rPr lang="en-US" dirty="0"/>
-              <a:t>Example Output</a:t>
-            </a:r>
-          </a:p>
-          <a:p>
-            <a:pPr lvl="3"/>
-            <a:r>
-              <a:rPr lang="en-US" dirty="0"/>
-              <a:t>Amy Pond,12.2</a:t>
-            </a:r>
-          </a:p>
-          <a:p>
-            <a:pPr lvl="3"/>
-            <a:r>
-              <a:rPr lang="en-US" dirty="0"/>
-              <a:t>Rory Williams,14.22</a:t>
-            </a:r>
-          </a:p>
-          <a:p>
-            <a:pPr lvl="3"/>
-            <a:r>
-              <a:rPr lang="en-US" dirty="0"/>
-              <a:t>Clara Osborn,100.12</a:t>
-            </a:r>
-          </a:p>
-        </p:txBody>
-      </p:sp>
-    </p:spTree>
-    <p:extLst>
-      <p:ext uri="{BB962C8B-B14F-4D97-AF65-F5344CB8AC3E}">
-        <p14:creationId xmlns:p14="http://schemas.microsoft.com/office/powerpoint/2010/main" val="3369171097"/>
-      </p:ext>
-    </p:extLst>
-  </p:cSld>
-  <p:clrMapOvr>
-    <a:masterClrMapping/>
-  </p:clrMapOvr>
-  <mc:AlternateContent xmlns:mc="http://schemas.openxmlformats.org/markup-compatibility/2006" xmlns:p14="http://schemas.microsoft.com/office/powerpoint/2010/main">
-    <mc:Choice Requires="p14">
-      <p:transition p14:dur="300">
-        <p:fade/>
-      </p:transition>
-    </mc:Choice>
-    <mc:Fallback xmlns="">
+    <mc:Fallback>
       <p:transition>
         <p:fade/>
       </p:transition>

</xml_diff>